<commit_message>
changes to homework 3
</commit_message>
<xml_diff>
--- a/Homeworks/week1/Homework3-graph.pptx
+++ b/Homeworks/week1/Homework3-graph.pptx
@@ -302,7 +302,7 @@
           <a:p>
             <a:fld id="{1E6AFDBF-5C68-4BC7-AB71-7BF2CC580C69}" type="datetimeFigureOut">
               <a:rPr lang="en-US" smtClean="0"/>
-              <a:t>9/25/2018</a:t>
+              <a:t>9/30/2018</a:t>
             </a:fld>
             <a:endParaRPr lang="en-US"/>
           </a:p>
@@ -470,7 +470,7 @@
           <a:p>
             <a:fld id="{1E6AFDBF-5C68-4BC7-AB71-7BF2CC580C69}" type="datetimeFigureOut">
               <a:rPr lang="en-US" smtClean="0"/>
-              <a:t>9/25/2018</a:t>
+              <a:t>9/30/2018</a:t>
             </a:fld>
             <a:endParaRPr lang="en-US"/>
           </a:p>
@@ -648,7 +648,7 @@
           <a:p>
             <a:fld id="{1E6AFDBF-5C68-4BC7-AB71-7BF2CC580C69}" type="datetimeFigureOut">
               <a:rPr lang="en-US" smtClean="0"/>
-              <a:t>9/25/2018</a:t>
+              <a:t>9/30/2018</a:t>
             </a:fld>
             <a:endParaRPr lang="en-US"/>
           </a:p>
@@ -816,7 +816,7 @@
           <a:p>
             <a:fld id="{1E6AFDBF-5C68-4BC7-AB71-7BF2CC580C69}" type="datetimeFigureOut">
               <a:rPr lang="en-US" smtClean="0"/>
-              <a:t>9/25/2018</a:t>
+              <a:t>9/30/2018</a:t>
             </a:fld>
             <a:endParaRPr lang="en-US"/>
           </a:p>
@@ -1061,7 +1061,7 @@
           <a:p>
             <a:fld id="{1E6AFDBF-5C68-4BC7-AB71-7BF2CC580C69}" type="datetimeFigureOut">
               <a:rPr lang="en-US" smtClean="0"/>
-              <a:t>9/25/2018</a:t>
+              <a:t>9/30/2018</a:t>
             </a:fld>
             <a:endParaRPr lang="en-US"/>
           </a:p>
@@ -1346,7 +1346,7 @@
           <a:p>
             <a:fld id="{1E6AFDBF-5C68-4BC7-AB71-7BF2CC580C69}" type="datetimeFigureOut">
               <a:rPr lang="en-US" smtClean="0"/>
-              <a:t>9/25/2018</a:t>
+              <a:t>9/30/2018</a:t>
             </a:fld>
             <a:endParaRPr lang="en-US"/>
           </a:p>
@@ -1765,7 +1765,7 @@
           <a:p>
             <a:fld id="{1E6AFDBF-5C68-4BC7-AB71-7BF2CC580C69}" type="datetimeFigureOut">
               <a:rPr lang="en-US" smtClean="0"/>
-              <a:t>9/25/2018</a:t>
+              <a:t>9/30/2018</a:t>
             </a:fld>
             <a:endParaRPr lang="en-US"/>
           </a:p>
@@ -1882,7 +1882,7 @@
           <a:p>
             <a:fld id="{1E6AFDBF-5C68-4BC7-AB71-7BF2CC580C69}" type="datetimeFigureOut">
               <a:rPr lang="en-US" smtClean="0"/>
-              <a:t>9/25/2018</a:t>
+              <a:t>9/30/2018</a:t>
             </a:fld>
             <a:endParaRPr lang="en-US"/>
           </a:p>
@@ -1977,7 +1977,7 @@
           <a:p>
             <a:fld id="{1E6AFDBF-5C68-4BC7-AB71-7BF2CC580C69}" type="datetimeFigureOut">
               <a:rPr lang="en-US" smtClean="0"/>
-              <a:t>9/25/2018</a:t>
+              <a:t>9/30/2018</a:t>
             </a:fld>
             <a:endParaRPr lang="en-US"/>
           </a:p>
@@ -2252,7 +2252,7 @@
           <a:p>
             <a:fld id="{1E6AFDBF-5C68-4BC7-AB71-7BF2CC580C69}" type="datetimeFigureOut">
               <a:rPr lang="en-US" smtClean="0"/>
-              <a:t>9/25/2018</a:t>
+              <a:t>9/30/2018</a:t>
             </a:fld>
             <a:endParaRPr lang="en-US"/>
           </a:p>
@@ -2504,7 +2504,7 @@
           <a:p>
             <a:fld id="{1E6AFDBF-5C68-4BC7-AB71-7BF2CC580C69}" type="datetimeFigureOut">
               <a:rPr lang="en-US" smtClean="0"/>
-              <a:t>9/25/2018</a:t>
+              <a:t>9/30/2018</a:t>
             </a:fld>
             <a:endParaRPr lang="en-US"/>
           </a:p>
@@ -2715,7 +2715,7 @@
           <a:p>
             <a:fld id="{1E6AFDBF-5C68-4BC7-AB71-7BF2CC580C69}" type="datetimeFigureOut">
               <a:rPr lang="en-US" smtClean="0"/>
-              <a:t>9/25/2018</a:t>
+              <a:t>9/30/2018</a:t>
             </a:fld>
             <a:endParaRPr lang="en-US"/>
           </a:p>
@@ -3417,13 +3417,13 @@
           <p:nvPr/>
         </p:nvSpPr>
         <p:spPr>
-          <a:xfrm rot="5110855">
-            <a:off x="5673549" y="3820720"/>
-            <a:ext cx="1670065" cy="1959760"/>
+          <a:xfrm rot="4867933">
+            <a:off x="5578699" y="3725059"/>
+            <a:ext cx="1767853" cy="2066932"/>
           </a:xfrm>
           <a:prstGeom prst="arc">
             <a:avLst>
-              <a:gd name="adj1" fmla="val 17724426"/>
+              <a:gd name="adj1" fmla="val 17907076"/>
               <a:gd name="adj2" fmla="val 169469"/>
             </a:avLst>
           </a:prstGeom>

</xml_diff>